<commit_message>
Typo corrections from lecture
</commit_message>
<xml_diff>
--- a/slides/5_DistanceAndSimilarityMeasures.pptx
+++ b/slides/5_DistanceAndSimilarityMeasures.pptx
@@ -26070,8 +26070,8 @@
           </a:p>
         </p:txBody>
       </p:sp>
-      <mc:AlternateContent xmlns:mc="http://schemas.openxmlformats.org/markup-compatibility/2006" xmlns:a14="http://schemas.microsoft.com/office/drawing/2010/main">
-        <mc:Choice Requires="a14">
+      <mc:AlternateContent xmlns:mc="http://schemas.openxmlformats.org/markup-compatibility/2006">
+        <mc:Choice xmlns:a14="http://schemas.microsoft.com/office/drawing/2010/main" Requires="a14">
           <p:sp>
             <p:nvSpPr>
               <p:cNvPr id="3" name="Content Placeholder 2"/>
@@ -26109,7 +26109,7 @@
                   <a:rPr lang="en-US" b="1" dirty="0">
                     <a:latin typeface="+mn-lt"/>
                   </a:rPr>
-                  <a:t>Pearson distance correlation</a:t>
+                  <a:t>Pearson correlation</a:t>
                 </a:r>
                 <a:r>
                   <a:rPr lang="en-US" dirty="0">
@@ -26707,7 +26707,7 @@
             </p:txBody>
           </p:sp>
         </mc:Choice>
-        <mc:Fallback xmlns="">
+        <mc:Fallback>
           <p:sp>
             <p:nvSpPr>
               <p:cNvPr id="3" name="Content Placeholder 2"/>

</xml_diff>